<commit_message>
Fixed font and added text box
</commit_message>
<xml_diff>
--- a/Slides/Unit 5 - Graphs.pptx
+++ b/Slides/Unit 5 - Graphs.pptx
@@ -12151,6 +12151,11 @@
             <a:off x="677334" y="1290919"/>
             <a:ext cx="8596668" cy="4750444"/>
           </a:xfrm>
+          <a:ln>
+            <a:solidFill>
+              <a:schemeClr val="tx1"/>
+            </a:solidFill>
+          </a:ln>
         </p:spPr>
         <p:txBody>
           <a:bodyPr>
@@ -12179,7 +12184,7 @@
             </a:br>
             <a:r>
               <a:rPr lang="pt-BR" sz="2500" dirty="0">
-                <a:latin typeface="Courier New" panose="02070309020205020404" pitchFamily="49" charset="0"/>
+                <a:latin typeface="Consolas" panose="020B0609020204030204" pitchFamily="49" charset="0"/>
                 <a:cs typeface="Courier New" panose="02070309020205020404" pitchFamily="49" charset="0"/>
               </a:rPr>
               <a:t>Breadth-First-Search(Graph, root)</a:t>
@@ -12191,7 +12196,7 @@
             </a:pPr>
             <a:r>
               <a:rPr lang="pt-BR" sz="2500" dirty="0">
-                <a:latin typeface="Courier New" panose="02070309020205020404" pitchFamily="49" charset="0"/>
+                <a:latin typeface="Consolas" panose="020B0609020204030204" pitchFamily="49" charset="0"/>
                 <a:cs typeface="Courier New" panose="02070309020205020404" pitchFamily="49" charset="0"/>
               </a:rPr>
               <a:t>    for each node n in Graph:            </a:t>
@@ -12203,7 +12208,7 @@
             </a:pPr>
             <a:r>
               <a:rPr lang="pt-BR" sz="2500" dirty="0">
-                <a:latin typeface="Courier New" panose="02070309020205020404" pitchFamily="49" charset="0"/>
+                <a:latin typeface="Consolas" panose="020B0609020204030204" pitchFamily="49" charset="0"/>
                 <a:cs typeface="Courier New" panose="02070309020205020404" pitchFamily="49" charset="0"/>
               </a:rPr>
               <a:t>        n.distance = INFINITY        </a:t>
@@ -12215,7 +12220,7 @@
             </a:pPr>
             <a:r>
               <a:rPr lang="pt-BR" sz="2500" dirty="0">
-                <a:latin typeface="Courier New" panose="02070309020205020404" pitchFamily="49" charset="0"/>
+                <a:latin typeface="Consolas" panose="020B0609020204030204" pitchFamily="49" charset="0"/>
                 <a:cs typeface="Courier New" panose="02070309020205020404" pitchFamily="49" charset="0"/>
               </a:rPr>
               <a:t>        n.parent = NIL</a:t>
@@ -12227,7 +12232,7 @@
             </a:pPr>
             <a:r>
               <a:rPr lang="pt-BR" sz="2500" dirty="0">
-                <a:latin typeface="Courier New" panose="02070309020205020404" pitchFamily="49" charset="0"/>
+                <a:latin typeface="Consolas" panose="020B0609020204030204" pitchFamily="49" charset="0"/>
                 <a:cs typeface="Courier New" panose="02070309020205020404" pitchFamily="49" charset="0"/>
               </a:rPr>
               <a:t>    create empty queue Q      </a:t>
@@ -12239,7 +12244,7 @@
             </a:pPr>
             <a:r>
               <a:rPr lang="pt-BR" sz="2500" dirty="0">
-                <a:latin typeface="Courier New" panose="02070309020205020404" pitchFamily="49" charset="0"/>
+                <a:latin typeface="Consolas" panose="020B0609020204030204" pitchFamily="49" charset="0"/>
                 <a:cs typeface="Courier New" panose="02070309020205020404" pitchFamily="49" charset="0"/>
               </a:rPr>
               <a:t>    root.distance = 0</a:t>
@@ -12251,7 +12256,7 @@
             </a:pPr>
             <a:r>
               <a:rPr lang="pt-BR" sz="2500" dirty="0">
-                <a:latin typeface="Courier New" panose="02070309020205020404" pitchFamily="49" charset="0"/>
+                <a:latin typeface="Consolas" panose="020B0609020204030204" pitchFamily="49" charset="0"/>
                 <a:cs typeface="Courier New" panose="02070309020205020404" pitchFamily="49" charset="0"/>
               </a:rPr>
               <a:t>    Q.enqueue(root)                      </a:t>
@@ -12263,7 +12268,7 @@
             </a:pPr>
             <a:r>
               <a:rPr lang="pt-BR" sz="2500" dirty="0">
-                <a:latin typeface="Courier New" panose="02070309020205020404" pitchFamily="49" charset="0"/>
+                <a:latin typeface="Consolas" panose="020B0609020204030204" pitchFamily="49" charset="0"/>
                 <a:cs typeface="Courier New" panose="02070309020205020404" pitchFamily="49" charset="0"/>
               </a:rPr>
               <a:t>    while Q is not empty:        </a:t>
@@ -12275,7 +12280,7 @@
             </a:pPr>
             <a:r>
               <a:rPr lang="pt-BR" sz="2500" dirty="0">
-                <a:latin typeface="Courier New" panose="02070309020205020404" pitchFamily="49" charset="0"/>
+                <a:latin typeface="Consolas" panose="020B0609020204030204" pitchFamily="49" charset="0"/>
                 <a:cs typeface="Courier New" panose="02070309020205020404" pitchFamily="49" charset="0"/>
               </a:rPr>
               <a:t>        current = Q.dequeue()</a:t>
@@ -12287,7 +12292,7 @@
             </a:pPr>
             <a:r>
               <a:rPr lang="pt-BR" sz="2500" dirty="0">
-                <a:latin typeface="Courier New" panose="02070309020205020404" pitchFamily="49" charset="0"/>
+                <a:latin typeface="Consolas" panose="020B0609020204030204" pitchFamily="49" charset="0"/>
                 <a:cs typeface="Courier New" panose="02070309020205020404" pitchFamily="49" charset="0"/>
               </a:rPr>
               <a:t>        for each node n that is adjacent to current:</a:t>
@@ -12299,7 +12304,7 @@
             </a:pPr>
             <a:r>
               <a:rPr lang="pt-BR" sz="2500" dirty="0">
-                <a:latin typeface="Courier New" panose="02070309020205020404" pitchFamily="49" charset="0"/>
+                <a:latin typeface="Consolas" panose="020B0609020204030204" pitchFamily="49" charset="0"/>
                 <a:cs typeface="Courier New" panose="02070309020205020404" pitchFamily="49" charset="0"/>
               </a:rPr>
               <a:t>            if n.distance == INFINITY:</a:t>
@@ -12311,7 +12316,7 @@
             </a:pPr>
             <a:r>
               <a:rPr lang="pt-BR" sz="2500" dirty="0">
-                <a:latin typeface="Courier New" panose="02070309020205020404" pitchFamily="49" charset="0"/>
+                <a:latin typeface="Consolas" panose="020B0609020204030204" pitchFamily="49" charset="0"/>
                 <a:cs typeface="Courier New" panose="02070309020205020404" pitchFamily="49" charset="0"/>
               </a:rPr>
               <a:t>                n.distance = current.distance + 1</a:t>
@@ -12323,7 +12328,7 @@
             </a:pPr>
             <a:r>
               <a:rPr lang="pt-BR" sz="2500" dirty="0">
-                <a:latin typeface="Courier New" panose="02070309020205020404" pitchFamily="49" charset="0"/>
+                <a:latin typeface="Consolas" panose="020B0609020204030204" pitchFamily="49" charset="0"/>
                 <a:cs typeface="Courier New" panose="02070309020205020404" pitchFamily="49" charset="0"/>
               </a:rPr>
               <a:t>                n.parent = current</a:t>
@@ -12335,15 +12340,11 @@
             </a:pPr>
             <a:r>
               <a:rPr lang="pt-BR" sz="2500" dirty="0">
-                <a:latin typeface="Courier New" panose="02070309020205020404" pitchFamily="49" charset="0"/>
+                <a:latin typeface="Consolas" panose="020B0609020204030204" pitchFamily="49" charset="0"/>
                 <a:cs typeface="Courier New" panose="02070309020205020404" pitchFamily="49" charset="0"/>
               </a:rPr>
               <a:t>                Q.enqueue(n)</a:t>
             </a:r>
-            <a:endParaRPr lang="pt-BR" sz="2500" dirty="0">
-              <a:latin typeface="Courier New" panose="02070309020205020404" pitchFamily="49" charset="0"/>
-              <a:cs typeface="Courier New" panose="02070309020205020404" pitchFamily="49" charset="0"/>
-            </a:endParaRPr>
           </a:p>
           <a:p>
             <a:pPr lvl="1"/>
@@ -13703,6 +13704,11 @@
             <a:off x="677334" y="1237129"/>
             <a:ext cx="8596668" cy="4804233"/>
           </a:xfrm>
+          <a:ln>
+            <a:solidFill>
+              <a:schemeClr val="tx1"/>
+            </a:solidFill>
+          </a:ln>
         </p:spPr>
         <p:txBody>
           <a:bodyPr>
@@ -13727,21 +13733,21 @@
             </a:br>
             <a:r>
               <a:rPr lang="en-US" sz="1600" dirty="0">
-                <a:latin typeface="Courier New" panose="02070309020205020404" pitchFamily="49" charset="0"/>
+                <a:latin typeface="Consolas" panose="020B0609020204030204" pitchFamily="49" charset="0"/>
                 <a:cs typeface="Courier New" panose="02070309020205020404" pitchFamily="49" charset="0"/>
               </a:rPr>
               <a:t>procedure DFS-iterative(</a:t>
             </a:r>
             <a:r>
               <a:rPr lang="en-US" sz="1600" dirty="0" err="1">
-                <a:latin typeface="Courier New" panose="02070309020205020404" pitchFamily="49" charset="0"/>
+                <a:latin typeface="Consolas" panose="020B0609020204030204" pitchFamily="49" charset="0"/>
                 <a:cs typeface="Courier New" panose="02070309020205020404" pitchFamily="49" charset="0"/>
               </a:rPr>
               <a:t>G,v</a:t>
             </a:r>
             <a:r>
               <a:rPr lang="en-US" sz="1600" dirty="0">
-                <a:latin typeface="Courier New" panose="02070309020205020404" pitchFamily="49" charset="0"/>
+                <a:latin typeface="Consolas" panose="020B0609020204030204" pitchFamily="49" charset="0"/>
                 <a:cs typeface="Courier New" panose="02070309020205020404" pitchFamily="49" charset="0"/>
               </a:rPr>
               <a:t>):</a:t>
@@ -13753,7 +13759,7 @@
             </a:pPr>
             <a:r>
               <a:rPr lang="en-US" sz="1600" dirty="0">
-                <a:latin typeface="Courier New" panose="02070309020205020404" pitchFamily="49" charset="0"/>
+                <a:latin typeface="Consolas" panose="020B0609020204030204" pitchFamily="49" charset="0"/>
                 <a:cs typeface="Courier New" panose="02070309020205020404" pitchFamily="49" charset="0"/>
               </a:rPr>
               <a:t>  let S be a stack</a:t>
@@ -13765,21 +13771,21 @@
             </a:pPr>
             <a:r>
               <a:rPr lang="en-US" sz="1600" dirty="0">
-                <a:latin typeface="Courier New" panose="02070309020205020404" pitchFamily="49" charset="0"/>
+                <a:latin typeface="Consolas" panose="020B0609020204030204" pitchFamily="49" charset="0"/>
                 <a:cs typeface="Courier New" panose="02070309020205020404" pitchFamily="49" charset="0"/>
               </a:rPr>
               <a:t>  </a:t>
             </a:r>
             <a:r>
               <a:rPr lang="en-US" sz="1600" dirty="0" err="1">
-                <a:latin typeface="Courier New" panose="02070309020205020404" pitchFamily="49" charset="0"/>
+                <a:latin typeface="Consolas" panose="020B0609020204030204" pitchFamily="49" charset="0"/>
                 <a:cs typeface="Courier New" panose="02070309020205020404" pitchFamily="49" charset="0"/>
               </a:rPr>
               <a:t>S.push</a:t>
             </a:r>
             <a:r>
               <a:rPr lang="en-US" sz="1600" dirty="0">
-                <a:latin typeface="Courier New" panose="02070309020205020404" pitchFamily="49" charset="0"/>
+                <a:latin typeface="Consolas" panose="020B0609020204030204" pitchFamily="49" charset="0"/>
                 <a:cs typeface="Courier New" panose="02070309020205020404" pitchFamily="49" charset="0"/>
               </a:rPr>
               <a:t>(v)</a:t>
@@ -13791,7 +13797,7 @@
             </a:pPr>
             <a:r>
               <a:rPr lang="en-US" sz="1600" dirty="0">
-                <a:latin typeface="Courier New" panose="02070309020205020404" pitchFamily="49" charset="0"/>
+                <a:latin typeface="Consolas" panose="020B0609020204030204" pitchFamily="49" charset="0"/>
                 <a:cs typeface="Courier New" panose="02070309020205020404" pitchFamily="49" charset="0"/>
               </a:rPr>
               <a:t>  while S is not empty</a:t>
@@ -13803,21 +13809,21 @@
             </a:pPr>
             <a:r>
               <a:rPr lang="en-US" sz="1600" dirty="0">
-                <a:latin typeface="Courier New" panose="02070309020205020404" pitchFamily="49" charset="0"/>
+                <a:latin typeface="Consolas" panose="020B0609020204030204" pitchFamily="49" charset="0"/>
                 <a:cs typeface="Courier New" panose="02070309020205020404" pitchFamily="49" charset="0"/>
               </a:rPr>
               <a:t>      v = </a:t>
             </a:r>
             <a:r>
               <a:rPr lang="en-US" sz="1600" dirty="0" err="1">
-                <a:latin typeface="Courier New" panose="02070309020205020404" pitchFamily="49" charset="0"/>
+                <a:latin typeface="Consolas" panose="020B0609020204030204" pitchFamily="49" charset="0"/>
                 <a:cs typeface="Courier New" panose="02070309020205020404" pitchFamily="49" charset="0"/>
               </a:rPr>
               <a:t>S.pop</a:t>
             </a:r>
             <a:r>
               <a:rPr lang="en-US" sz="1600" dirty="0">
-                <a:latin typeface="Courier New" panose="02070309020205020404" pitchFamily="49" charset="0"/>
+                <a:latin typeface="Consolas" panose="020B0609020204030204" pitchFamily="49" charset="0"/>
                 <a:cs typeface="Courier New" panose="02070309020205020404" pitchFamily="49" charset="0"/>
               </a:rPr>
               <a:t>()</a:t>
@@ -13829,7 +13835,7 @@
             </a:pPr>
             <a:r>
               <a:rPr lang="en-US" sz="1600" dirty="0">
-                <a:latin typeface="Courier New" panose="02070309020205020404" pitchFamily="49" charset="0"/>
+                <a:latin typeface="Consolas" panose="020B0609020204030204" pitchFamily="49" charset="0"/>
                 <a:cs typeface="Courier New" panose="02070309020205020404" pitchFamily="49" charset="0"/>
               </a:rPr>
               <a:t>      if v is not labeled as discovered:</a:t>
@@ -13841,7 +13847,7 @@
             </a:pPr>
             <a:r>
               <a:rPr lang="en-US" sz="1600" dirty="0">
-                <a:latin typeface="Courier New" panose="02070309020205020404" pitchFamily="49" charset="0"/>
+                <a:latin typeface="Consolas" panose="020B0609020204030204" pitchFamily="49" charset="0"/>
                 <a:cs typeface="Courier New" panose="02070309020205020404" pitchFamily="49" charset="0"/>
               </a:rPr>
               <a:t>          label v as discovered</a:t>
@@ -13853,21 +13859,21 @@
             </a:pPr>
             <a:r>
               <a:rPr lang="en-US" sz="1600" dirty="0">
-                <a:latin typeface="Courier New" panose="02070309020205020404" pitchFamily="49" charset="0"/>
+                <a:latin typeface="Consolas" panose="020B0609020204030204" pitchFamily="49" charset="0"/>
                 <a:cs typeface="Courier New" panose="02070309020205020404" pitchFamily="49" charset="0"/>
               </a:rPr>
               <a:t>          for all edges from v to w in </a:t>
             </a:r>
             <a:r>
               <a:rPr lang="en-US" sz="1600" dirty="0" err="1">
-                <a:latin typeface="Courier New" panose="02070309020205020404" pitchFamily="49" charset="0"/>
+                <a:latin typeface="Consolas" panose="020B0609020204030204" pitchFamily="49" charset="0"/>
                 <a:cs typeface="Courier New" panose="02070309020205020404" pitchFamily="49" charset="0"/>
               </a:rPr>
               <a:t>G.adjacentEdges</a:t>
             </a:r>
             <a:r>
               <a:rPr lang="en-US" sz="1600" dirty="0">
-                <a:latin typeface="Courier New" panose="02070309020205020404" pitchFamily="49" charset="0"/>
+                <a:latin typeface="Consolas" panose="020B0609020204030204" pitchFamily="49" charset="0"/>
                 <a:cs typeface="Courier New" panose="02070309020205020404" pitchFamily="49" charset="0"/>
               </a:rPr>
               <a:t>(v) do</a:t>
@@ -13879,27 +13885,27 @@
             </a:pPr>
             <a:r>
               <a:rPr lang="en-US" sz="1600" dirty="0">
-                <a:latin typeface="Courier New" panose="02070309020205020404" pitchFamily="49" charset="0"/>
+                <a:latin typeface="Consolas" panose="020B0609020204030204" pitchFamily="49" charset="0"/>
                 <a:cs typeface="Courier New" panose="02070309020205020404" pitchFamily="49" charset="0"/>
               </a:rPr>
               <a:t>             </a:t>
             </a:r>
             <a:r>
               <a:rPr lang="en-US" sz="1600" dirty="0" err="1">
-                <a:latin typeface="Courier New" panose="02070309020205020404" pitchFamily="49" charset="0"/>
+                <a:latin typeface="Consolas" panose="020B0609020204030204" pitchFamily="49" charset="0"/>
                 <a:cs typeface="Courier New" panose="02070309020205020404" pitchFamily="49" charset="0"/>
               </a:rPr>
               <a:t>S.push</a:t>
             </a:r>
             <a:r>
               <a:rPr lang="en-US" sz="1600" dirty="0">
-                <a:latin typeface="Courier New" panose="02070309020205020404" pitchFamily="49" charset="0"/>
+                <a:latin typeface="Consolas" panose="020B0609020204030204" pitchFamily="49" charset="0"/>
                 <a:cs typeface="Courier New" panose="02070309020205020404" pitchFamily="49" charset="0"/>
               </a:rPr>
               <a:t>(w)</a:t>
             </a:r>
             <a:endParaRPr lang="it-IT" sz="1600" dirty="0">
-              <a:latin typeface="Courier New" panose="02070309020205020404" pitchFamily="49" charset="0"/>
+              <a:latin typeface="Consolas" panose="020B0609020204030204" pitchFamily="49" charset="0"/>
               <a:cs typeface="Courier New" panose="02070309020205020404" pitchFamily="49" charset="0"/>
             </a:endParaRPr>
           </a:p>
@@ -37375,6 +37381,11 @@
             <a:off x="677334" y="1559859"/>
             <a:ext cx="8596668" cy="4481503"/>
           </a:xfrm>
+          <a:ln>
+            <a:solidFill>
+              <a:schemeClr val="tx1"/>
+            </a:solidFill>
+          </a:ln>
         </p:spPr>
         <p:txBody>
           <a:bodyPr>
@@ -37387,7 +37398,7 @@
             </a:pPr>
             <a:r>
               <a:rPr lang="en-US" dirty="0">
-                <a:latin typeface="Courier New" panose="02070309020205020404" pitchFamily="49" charset="0"/>
+                <a:latin typeface="Consolas" panose="020B0609020204030204" pitchFamily="49" charset="0"/>
                 <a:cs typeface="Courier New" panose="02070309020205020404" pitchFamily="49" charset="0"/>
               </a:rPr>
               <a:t>function Dijkstra(Graph, source):</a:t>
@@ -37399,7 +37410,7 @@
             </a:pPr>
             <a:r>
               <a:rPr lang="en-US" dirty="0">
-                <a:latin typeface="Courier New" panose="02070309020205020404" pitchFamily="49" charset="0"/>
+                <a:latin typeface="Consolas" panose="020B0609020204030204" pitchFamily="49" charset="0"/>
                 <a:cs typeface="Courier New" panose="02070309020205020404" pitchFamily="49" charset="0"/>
               </a:rPr>
               <a:t>    create vertex set Q</a:t>
@@ -37411,7 +37422,7 @@
             </a:pPr>
             <a:r>
               <a:rPr lang="en-US" dirty="0">
-                <a:latin typeface="Courier New" panose="02070309020205020404" pitchFamily="49" charset="0"/>
+                <a:latin typeface="Consolas" panose="020B0609020204030204" pitchFamily="49" charset="0"/>
                 <a:cs typeface="Courier New" panose="02070309020205020404" pitchFamily="49" charset="0"/>
               </a:rPr>
               <a:t>    for each vertex v in Graph:             // Initialization</a:t>
@@ -37423,21 +37434,21 @@
             </a:pPr>
             <a:r>
               <a:rPr lang="en-US" dirty="0">
-                <a:latin typeface="Courier New" panose="02070309020205020404" pitchFamily="49" charset="0"/>
+                <a:latin typeface="Consolas" panose="020B0609020204030204" pitchFamily="49" charset="0"/>
                 <a:cs typeface="Courier New" panose="02070309020205020404" pitchFamily="49" charset="0"/>
               </a:rPr>
               <a:t>        </a:t>
             </a:r>
             <a:r>
               <a:rPr lang="en-US" dirty="0" err="1">
-                <a:latin typeface="Courier New" panose="02070309020205020404" pitchFamily="49" charset="0"/>
+                <a:latin typeface="Consolas" panose="020B0609020204030204" pitchFamily="49" charset="0"/>
                 <a:cs typeface="Courier New" panose="02070309020205020404" pitchFamily="49" charset="0"/>
               </a:rPr>
               <a:t>dist</a:t>
             </a:r>
             <a:r>
               <a:rPr lang="en-US" dirty="0">
-                <a:latin typeface="Courier New" panose="02070309020205020404" pitchFamily="49" charset="0"/>
+                <a:latin typeface="Consolas" panose="020B0609020204030204" pitchFamily="49" charset="0"/>
                 <a:cs typeface="Courier New" panose="02070309020205020404" pitchFamily="49" charset="0"/>
               </a:rPr>
               <a:t>[v] ← INFINITY                  // Unknown distance from source to v</a:t>
@@ -37449,21 +37460,21 @@
             </a:pPr>
             <a:r>
               <a:rPr lang="en-US" dirty="0">
-                <a:latin typeface="Courier New" panose="02070309020205020404" pitchFamily="49" charset="0"/>
+                <a:latin typeface="Consolas" panose="020B0609020204030204" pitchFamily="49" charset="0"/>
                 <a:cs typeface="Courier New" panose="02070309020205020404" pitchFamily="49" charset="0"/>
               </a:rPr>
               <a:t>        </a:t>
             </a:r>
             <a:r>
               <a:rPr lang="en-US" dirty="0" err="1">
-                <a:latin typeface="Courier New" panose="02070309020205020404" pitchFamily="49" charset="0"/>
+                <a:latin typeface="Consolas" panose="020B0609020204030204" pitchFamily="49" charset="0"/>
                 <a:cs typeface="Courier New" panose="02070309020205020404" pitchFamily="49" charset="0"/>
               </a:rPr>
               <a:t>prev</a:t>
             </a:r>
             <a:r>
               <a:rPr lang="en-US" dirty="0">
-                <a:latin typeface="Courier New" panose="02070309020205020404" pitchFamily="49" charset="0"/>
+                <a:latin typeface="Consolas" panose="020B0609020204030204" pitchFamily="49" charset="0"/>
                 <a:cs typeface="Courier New" panose="02070309020205020404" pitchFamily="49" charset="0"/>
               </a:rPr>
               <a:t>[v] ← UNDEFINED                 // Previous node in optimal path from source</a:t>
@@ -37475,7 +37486,7 @@
             </a:pPr>
             <a:r>
               <a:rPr lang="en-US" dirty="0">
-                <a:latin typeface="Courier New" panose="02070309020205020404" pitchFamily="49" charset="0"/>
+                <a:latin typeface="Consolas" panose="020B0609020204030204" pitchFamily="49" charset="0"/>
                 <a:cs typeface="Courier New" panose="02070309020205020404" pitchFamily="49" charset="0"/>
               </a:rPr>
               <a:t>        add v to Q                          // All nodes initially in Q (unvisited nodes)</a:t>
@@ -37487,21 +37498,21 @@
             </a:pPr>
             <a:r>
               <a:rPr lang="en-US" dirty="0">
-                <a:latin typeface="Courier New" panose="02070309020205020404" pitchFamily="49" charset="0"/>
+                <a:latin typeface="Consolas" panose="020B0609020204030204" pitchFamily="49" charset="0"/>
                 <a:cs typeface="Courier New" panose="02070309020205020404" pitchFamily="49" charset="0"/>
               </a:rPr>
               <a:t>    </a:t>
             </a:r>
             <a:r>
               <a:rPr lang="en-US" dirty="0" err="1">
-                <a:latin typeface="Courier New" panose="02070309020205020404" pitchFamily="49" charset="0"/>
+                <a:latin typeface="Consolas" panose="020B0609020204030204" pitchFamily="49" charset="0"/>
                 <a:cs typeface="Courier New" panose="02070309020205020404" pitchFamily="49" charset="0"/>
               </a:rPr>
               <a:t>dist</a:t>
             </a:r>
             <a:r>
               <a:rPr lang="en-US" dirty="0">
-                <a:latin typeface="Courier New" panose="02070309020205020404" pitchFamily="49" charset="0"/>
+                <a:latin typeface="Consolas" panose="020B0609020204030204" pitchFamily="49" charset="0"/>
                 <a:cs typeface="Courier New" panose="02070309020205020404" pitchFamily="49" charset="0"/>
               </a:rPr>
               <a:t>[source] ← 0                        // Distance from source to source  </a:t>
@@ -37513,7 +37524,7 @@
             </a:pPr>
             <a:r>
               <a:rPr lang="en-US" dirty="0">
-                <a:latin typeface="Courier New" panose="02070309020205020404" pitchFamily="49" charset="0"/>
+                <a:latin typeface="Consolas" panose="020B0609020204030204" pitchFamily="49" charset="0"/>
                 <a:cs typeface="Courier New" panose="02070309020205020404" pitchFamily="49" charset="0"/>
               </a:rPr>
               <a:t>    while Q is not empty:</a:t>
@@ -37525,21 +37536,21 @@
             </a:pPr>
             <a:r>
               <a:rPr lang="en-US" dirty="0">
-                <a:latin typeface="Courier New" panose="02070309020205020404" pitchFamily="49" charset="0"/>
+                <a:latin typeface="Consolas" panose="020B0609020204030204" pitchFamily="49" charset="0"/>
                 <a:cs typeface="Courier New" panose="02070309020205020404" pitchFamily="49" charset="0"/>
               </a:rPr>
               <a:t>       u ← vertex in Q with min </a:t>
             </a:r>
             <a:r>
               <a:rPr lang="en-US" dirty="0" err="1">
-                <a:latin typeface="Courier New" panose="02070309020205020404" pitchFamily="49" charset="0"/>
+                <a:latin typeface="Consolas" panose="020B0609020204030204" pitchFamily="49" charset="0"/>
                 <a:cs typeface="Courier New" panose="02070309020205020404" pitchFamily="49" charset="0"/>
               </a:rPr>
               <a:t>dist</a:t>
             </a:r>
             <a:r>
               <a:rPr lang="en-US" dirty="0">
-                <a:latin typeface="Courier New" panose="02070309020205020404" pitchFamily="49" charset="0"/>
+                <a:latin typeface="Consolas" panose="020B0609020204030204" pitchFamily="49" charset="0"/>
                 <a:cs typeface="Courier New" panose="02070309020205020404" pitchFamily="49" charset="0"/>
               </a:rPr>
               <a:t>[u]    // Source node will be selected first</a:t>
@@ -37551,7 +37562,7 @@
             </a:pPr>
             <a:r>
               <a:rPr lang="en-US" dirty="0">
-                <a:latin typeface="Courier New" panose="02070309020205020404" pitchFamily="49" charset="0"/>
+                <a:latin typeface="Consolas" panose="020B0609020204030204" pitchFamily="49" charset="0"/>
                 <a:cs typeface="Courier New" panose="02070309020205020404" pitchFamily="49" charset="0"/>
               </a:rPr>
               <a:t>        remove u from Q </a:t>
@@ -37563,7 +37574,7 @@
             </a:pPr>
             <a:r>
               <a:rPr lang="en-US" dirty="0">
-                <a:latin typeface="Courier New" panose="02070309020205020404" pitchFamily="49" charset="0"/>
+                <a:latin typeface="Consolas" panose="020B0609020204030204" pitchFamily="49" charset="0"/>
                 <a:cs typeface="Courier New" panose="02070309020205020404" pitchFamily="49" charset="0"/>
               </a:rPr>
               <a:t>        </a:t>
@@ -37575,7 +37586,7 @@
             </a:pPr>
             <a:r>
               <a:rPr lang="en-US" dirty="0">
-                <a:latin typeface="Courier New" panose="02070309020205020404" pitchFamily="49" charset="0"/>
+                <a:latin typeface="Consolas" panose="020B0609020204030204" pitchFamily="49" charset="0"/>
                 <a:cs typeface="Courier New" panose="02070309020205020404" pitchFamily="49" charset="0"/>
               </a:rPr>
               <a:t>       for each neighbor v of u:           // where v is still in Q.</a:t>
@@ -37587,21 +37598,21 @@
             </a:pPr>
             <a:r>
               <a:rPr lang="en-US" dirty="0">
-                <a:latin typeface="Courier New" panose="02070309020205020404" pitchFamily="49" charset="0"/>
+                <a:latin typeface="Consolas" panose="020B0609020204030204" pitchFamily="49" charset="0"/>
                 <a:cs typeface="Courier New" panose="02070309020205020404" pitchFamily="49" charset="0"/>
               </a:rPr>
               <a:t>           alt ← </a:t>
             </a:r>
             <a:r>
               <a:rPr lang="en-US" dirty="0" err="1">
-                <a:latin typeface="Courier New" panose="02070309020205020404" pitchFamily="49" charset="0"/>
+                <a:latin typeface="Consolas" panose="020B0609020204030204" pitchFamily="49" charset="0"/>
                 <a:cs typeface="Courier New" panose="02070309020205020404" pitchFamily="49" charset="0"/>
               </a:rPr>
               <a:t>dist</a:t>
             </a:r>
             <a:r>
               <a:rPr lang="en-US" dirty="0">
-                <a:latin typeface="Courier New" panose="02070309020205020404" pitchFamily="49" charset="0"/>
+                <a:latin typeface="Consolas" panose="020B0609020204030204" pitchFamily="49" charset="0"/>
                 <a:cs typeface="Courier New" panose="02070309020205020404" pitchFamily="49" charset="0"/>
               </a:rPr>
               <a:t>[u] + length(u, v)</a:t>
@@ -37613,21 +37624,21 @@
             </a:pPr>
             <a:r>
               <a:rPr lang="en-US" dirty="0">
-                <a:latin typeface="Courier New" panose="02070309020205020404" pitchFamily="49" charset="0"/>
+                <a:latin typeface="Consolas" panose="020B0609020204030204" pitchFamily="49" charset="0"/>
                 <a:cs typeface="Courier New" panose="02070309020205020404" pitchFamily="49" charset="0"/>
               </a:rPr>
               <a:t>           if alt &lt; </a:t>
             </a:r>
             <a:r>
               <a:rPr lang="en-US" dirty="0" err="1">
-                <a:latin typeface="Courier New" panose="02070309020205020404" pitchFamily="49" charset="0"/>
+                <a:latin typeface="Consolas" panose="020B0609020204030204" pitchFamily="49" charset="0"/>
                 <a:cs typeface="Courier New" panose="02070309020205020404" pitchFamily="49" charset="0"/>
               </a:rPr>
               <a:t>dist</a:t>
             </a:r>
             <a:r>
               <a:rPr lang="en-US" dirty="0">
-                <a:latin typeface="Courier New" panose="02070309020205020404" pitchFamily="49" charset="0"/>
+                <a:latin typeface="Consolas" panose="020B0609020204030204" pitchFamily="49" charset="0"/>
                 <a:cs typeface="Courier New" panose="02070309020205020404" pitchFamily="49" charset="0"/>
               </a:rPr>
               <a:t>[v]:               // A shorter path to v has been found</a:t>
@@ -37639,21 +37650,21 @@
             </a:pPr>
             <a:r>
               <a:rPr lang="en-US" dirty="0">
-                <a:latin typeface="Courier New" panose="02070309020205020404" pitchFamily="49" charset="0"/>
+                <a:latin typeface="Consolas" panose="020B0609020204030204" pitchFamily="49" charset="0"/>
                 <a:cs typeface="Courier New" panose="02070309020205020404" pitchFamily="49" charset="0"/>
               </a:rPr>
               <a:t>               </a:t>
             </a:r>
             <a:r>
               <a:rPr lang="en-US" dirty="0" err="1">
-                <a:latin typeface="Courier New" panose="02070309020205020404" pitchFamily="49" charset="0"/>
+                <a:latin typeface="Consolas" panose="020B0609020204030204" pitchFamily="49" charset="0"/>
                 <a:cs typeface="Courier New" panose="02070309020205020404" pitchFamily="49" charset="0"/>
               </a:rPr>
               <a:t>dist</a:t>
             </a:r>
             <a:r>
               <a:rPr lang="en-US" dirty="0">
-                <a:latin typeface="Courier New" panose="02070309020205020404" pitchFamily="49" charset="0"/>
+                <a:latin typeface="Consolas" panose="020B0609020204030204" pitchFamily="49" charset="0"/>
                 <a:cs typeface="Courier New" panose="02070309020205020404" pitchFamily="49" charset="0"/>
               </a:rPr>
               <a:t>[v] ← alt </a:t>
@@ -37665,21 +37676,21 @@
             </a:pPr>
             <a:r>
               <a:rPr lang="en-US" dirty="0">
-                <a:latin typeface="Courier New" panose="02070309020205020404" pitchFamily="49" charset="0"/>
+                <a:latin typeface="Consolas" panose="020B0609020204030204" pitchFamily="49" charset="0"/>
                 <a:cs typeface="Courier New" panose="02070309020205020404" pitchFamily="49" charset="0"/>
               </a:rPr>
               <a:t>               </a:t>
             </a:r>
             <a:r>
               <a:rPr lang="en-US" dirty="0" err="1">
-                <a:latin typeface="Courier New" panose="02070309020205020404" pitchFamily="49" charset="0"/>
+                <a:latin typeface="Consolas" panose="020B0609020204030204" pitchFamily="49" charset="0"/>
                 <a:cs typeface="Courier New" panose="02070309020205020404" pitchFamily="49" charset="0"/>
               </a:rPr>
               <a:t>prev</a:t>
             </a:r>
             <a:r>
               <a:rPr lang="en-US" dirty="0">
-                <a:latin typeface="Courier New" panose="02070309020205020404" pitchFamily="49" charset="0"/>
+                <a:latin typeface="Consolas" panose="020B0609020204030204" pitchFamily="49" charset="0"/>
                 <a:cs typeface="Courier New" panose="02070309020205020404" pitchFamily="49" charset="0"/>
               </a:rPr>
               <a:t>[v] ← u </a:t>
@@ -37691,41 +37702,41 @@
             </a:pPr>
             <a:r>
               <a:rPr lang="en-US" dirty="0">
-                <a:latin typeface="Courier New" panose="02070309020205020404" pitchFamily="49" charset="0"/>
+                <a:latin typeface="Consolas" panose="020B0609020204030204" pitchFamily="49" charset="0"/>
                 <a:cs typeface="Courier New" panose="02070309020205020404" pitchFamily="49" charset="0"/>
               </a:rPr>
               <a:t>    return </a:t>
             </a:r>
             <a:r>
               <a:rPr lang="en-US" dirty="0" err="1">
-                <a:latin typeface="Courier New" panose="02070309020205020404" pitchFamily="49" charset="0"/>
+                <a:latin typeface="Consolas" panose="020B0609020204030204" pitchFamily="49" charset="0"/>
                 <a:cs typeface="Courier New" panose="02070309020205020404" pitchFamily="49" charset="0"/>
               </a:rPr>
               <a:t>dist</a:t>
             </a:r>
             <a:r>
               <a:rPr lang="en-US" dirty="0">
-                <a:latin typeface="Courier New" panose="02070309020205020404" pitchFamily="49" charset="0"/>
+                <a:latin typeface="Consolas" panose="020B0609020204030204" pitchFamily="49" charset="0"/>
                 <a:cs typeface="Courier New" panose="02070309020205020404" pitchFamily="49" charset="0"/>
               </a:rPr>
               <a:t>[], </a:t>
             </a:r>
             <a:r>
               <a:rPr lang="en-US" dirty="0" err="1">
-                <a:latin typeface="Courier New" panose="02070309020205020404" pitchFamily="49" charset="0"/>
+                <a:latin typeface="Consolas" panose="020B0609020204030204" pitchFamily="49" charset="0"/>
                 <a:cs typeface="Courier New" panose="02070309020205020404" pitchFamily="49" charset="0"/>
               </a:rPr>
               <a:t>prev</a:t>
             </a:r>
             <a:r>
               <a:rPr lang="en-US" dirty="0">
-                <a:latin typeface="Courier New" panose="02070309020205020404" pitchFamily="49" charset="0"/>
+                <a:latin typeface="Consolas" panose="020B0609020204030204" pitchFamily="49" charset="0"/>
                 <a:cs typeface="Courier New" panose="02070309020205020404" pitchFamily="49" charset="0"/>
               </a:rPr>
               <a:t>[]</a:t>
             </a:r>
             <a:endParaRPr lang="it-IT" dirty="0">
-              <a:latin typeface="Courier New" panose="02070309020205020404" pitchFamily="49" charset="0"/>
+              <a:latin typeface="Consolas" panose="020B0609020204030204" pitchFamily="49" charset="0"/>
               <a:cs typeface="Courier New" panose="02070309020205020404" pitchFamily="49" charset="0"/>
             </a:endParaRPr>
           </a:p>

</xml_diff>